<commit_message>
Adding notes to presentation
</commit_message>
<xml_diff>
--- a/Golden Shoe Presentation.pptx
+++ b/Golden Shoe Presentation.pptx
@@ -113,6 +113,11 @@
       </a:defRPr>
     </a:lvl9pPr>
   </p:defaultTextStyle>
+  <p:extLst>
+    <p:ext uri="{EFAFB233-063F-42B5-8137-9DF3F51BA10A}">
+      <p15:sldGuideLst xmlns:p15="http://schemas.microsoft.com/office/powerpoint/2012/main"/>
+    </p:ext>
+  </p:extLst>
 </p:presentation>
 </file>
 
@@ -5131,7 +5136,7 @@
         <a:p>
           <a:r>
             <a:rPr lang="en-US" dirty="0"/>
-            <a:t>Golden Shoe challenges and desires?</a:t>
+            <a:t>Golden Shoe challenges and objectives?</a:t>
           </a:r>
         </a:p>
       </dgm:t>
@@ -6830,42 +6835,6 @@
         </a:p>
       </dgm:t>
     </dgm:pt>
-    <dgm:pt modelId="{96234BAB-EB68-47A7-A425-976ABF2B09FF}">
-      <dgm:prSet/>
-      <dgm:spPr/>
-      <dgm:t>
-        <a:bodyPr/>
-        <a:lstStyle/>
-        <a:p>
-          <a:r>
-            <a:rPr lang="en-US" dirty="0"/>
-            <a:t>Clear Visibility of Products</a:t>
-          </a:r>
-        </a:p>
-      </dgm:t>
-    </dgm:pt>
-    <dgm:pt modelId="{A452B632-1309-4BA5-9697-79FBA50B18C9}" type="parTrans" cxnId="{1B7FB0E4-D4F5-4D34-B3ED-C5ED92C1D5DC}">
-      <dgm:prSet/>
-      <dgm:spPr/>
-      <dgm:t>
-        <a:bodyPr/>
-        <a:lstStyle/>
-        <a:p>
-          <a:endParaRPr lang="en-US"/>
-        </a:p>
-      </dgm:t>
-    </dgm:pt>
-    <dgm:pt modelId="{1A841769-1D6B-4B86-8449-A0BAE97A7932}" type="sibTrans" cxnId="{1B7FB0E4-D4F5-4D34-B3ED-C5ED92C1D5DC}">
-      <dgm:prSet/>
-      <dgm:spPr/>
-      <dgm:t>
-        <a:bodyPr/>
-        <a:lstStyle/>
-        <a:p>
-          <a:endParaRPr lang="en-US"/>
-        </a:p>
-      </dgm:t>
-    </dgm:pt>
     <dgm:pt modelId="{CCBC7670-3C8D-4F3C-8782-6E55D07D1A1E}">
       <dgm:prSet/>
       <dgm:spPr/>
@@ -6964,6 +6933,42 @@
       </dgm:t>
     </dgm:pt>
     <dgm:pt modelId="{0AEF2800-7FD1-416B-8309-8FA5AC208FC5}" type="sibTrans" cxnId="{44920A49-549F-4E05-90C9-89DA4B08190E}">
+      <dgm:prSet/>
+      <dgm:spPr/>
+      <dgm:t>
+        <a:bodyPr/>
+        <a:lstStyle/>
+        <a:p>
+          <a:endParaRPr lang="en-US"/>
+        </a:p>
+      </dgm:t>
+    </dgm:pt>
+    <dgm:pt modelId="{96234BAB-EB68-47A7-A425-976ABF2B09FF}">
+      <dgm:prSet/>
+      <dgm:spPr/>
+      <dgm:t>
+        <a:bodyPr/>
+        <a:lstStyle/>
+        <a:p>
+          <a:r>
+            <a:rPr lang="en-US" dirty="0"/>
+            <a:t>Clear Visibility of Products</a:t>
+          </a:r>
+        </a:p>
+      </dgm:t>
+    </dgm:pt>
+    <dgm:pt modelId="{1A841769-1D6B-4B86-8449-A0BAE97A7932}" type="sibTrans" cxnId="{1B7FB0E4-D4F5-4D34-B3ED-C5ED92C1D5DC}">
+      <dgm:prSet/>
+      <dgm:spPr/>
+      <dgm:t>
+        <a:bodyPr/>
+        <a:lstStyle/>
+        <a:p>
+          <a:endParaRPr lang="en-US"/>
+        </a:p>
+      </dgm:t>
+    </dgm:pt>
+    <dgm:pt modelId="{A452B632-1309-4BA5-9697-79FBA50B18C9}" type="parTrans" cxnId="{1B7FB0E4-D4F5-4D34-B3ED-C5ED92C1D5DC}">
       <dgm:prSet/>
       <dgm:spPr/>
       <dgm:t>
@@ -7378,7 +7383,7 @@
   <dgm:whole/>
   <dgm:extLst>
     <a:ext uri="http://schemas.microsoft.com/office/drawing/2008/diagram">
-      <dsp:dataModelExt xmlns:dsp="http://schemas.microsoft.com/office/drawing/2008/diagram" relId="rId6" minVer="http://schemas.openxmlformats.org/drawingml/2006/diagram"/>
+      <dsp:dataModelExt xmlns:dsp="http://schemas.microsoft.com/office/drawing/2008/diagram" relId="rId7" minVer="http://schemas.openxmlformats.org/drawingml/2006/diagram"/>
     </a:ext>
   </dgm:extLst>
 </dgm:dataModel>
@@ -7593,7 +7598,7 @@
           </a:pPr>
           <a:r>
             <a:rPr lang="en-US" sz="2700" kern="1200" dirty="0"/>
-            <a:t>Golden Shoe challenges and desires?</a:t>
+            <a:t>Golden Shoe challenges and objectives?</a:t>
           </a:r>
         </a:p>
       </dsp:txBody>
@@ -19833,7 +19838,7 @@
           <a:p>
             <a:fld id="{A6059100-DD43-46E5-BD88-951798E0D86B}" type="datetimeFigureOut">
               <a:rPr lang="en-US" smtClean="0"/>
-              <a:t>3/1/2022</a:t>
+              <a:t>3/2/2022</a:t>
             </a:fld>
             <a:endParaRPr lang="en-US"/>
           </a:p>
@@ -20471,7 +20476,46 @@
           <a:bodyPr/>
           <a:lstStyle/>
           <a:p>
-            <a:endParaRPr lang="en-US" dirty="0"/>
+            <a:r>
+              <a:rPr lang="en-US" dirty="0"/>
+              <a:t>Modern e-commerce – Gives the business a chance to interact with the client while keeping them on the website leading to successful purchase. </a:t>
+            </a:r>
+          </a:p>
+          <a:p>
+            <a:r>
+              <a:rPr lang="en-US" dirty="0"/>
+              <a:t>Mobile – Allowing users to use the site on various platforms, more potential sales.</a:t>
+            </a:r>
+          </a:p>
+          <a:p>
+            <a:r>
+              <a:rPr lang="en-US" dirty="0"/>
+              <a:t>Stock – have good stock management system to show precisely how much stock is available, clear communication. </a:t>
+            </a:r>
+          </a:p>
+          <a:p>
+            <a:r>
+              <a:rPr lang="en-US" dirty="0"/>
+              <a:t>Clear visibility – possible to pull data from a database using an API to showcase more images and description. Less returns on colors and style.</a:t>
+            </a:r>
+          </a:p>
+          <a:p>
+            <a:r>
+              <a:rPr lang="en-US" dirty="0"/>
+              <a:t>Tracking – less calls for customer experience, as you can see clearly.</a:t>
+            </a:r>
+          </a:p>
+          <a:p>
+            <a:r>
+              <a:rPr lang="en-US" dirty="0"/>
+              <a:t>User Authentication – Have customer details, promos, marketing. </a:t>
+            </a:r>
+          </a:p>
+          <a:p>
+            <a:r>
+              <a:rPr lang="en-US" dirty="0"/>
+              <a:t>Agile – Provide coaching for all the teams so that the business has good structure and leadership. Less confusion amongst different business teams and within a team.</a:t>
+            </a:r>
           </a:p>
         </p:txBody>
       </p:sp>
@@ -20502,6 +20546,106 @@
     <p:extLst>
       <p:ext uri="{BB962C8B-B14F-4D97-AF65-F5344CB8AC3E}">
         <p14:creationId xmlns:p14="http://schemas.microsoft.com/office/powerpoint/2010/main" val="1760052891"/>
+      </p:ext>
+    </p:extLst>
+  </p:cSld>
+  <p:clrMapOvr>
+    <a:masterClrMapping/>
+  </p:clrMapOvr>
+</p:notes>
+</file>
+
+<file path=ppt/notesSlides/notesSlide5.xml><?xml version="1.0" encoding="utf-8"?>
+<p:notes xmlns:a="http://schemas.openxmlformats.org/drawingml/2006/main" xmlns:r="http://schemas.openxmlformats.org/officeDocument/2006/relationships" xmlns:p="http://schemas.openxmlformats.org/presentationml/2006/main">
+  <p:cSld>
+    <p:spTree>
+      <p:nvGrpSpPr>
+        <p:cNvPr id="1" name=""/>
+        <p:cNvGrpSpPr/>
+        <p:nvPr/>
+      </p:nvGrpSpPr>
+      <p:grpSpPr>
+        <a:xfrm>
+          <a:off x="0" y="0"/>
+          <a:ext cx="0" cy="0"/>
+          <a:chOff x="0" y="0"/>
+          <a:chExt cx="0" cy="0"/>
+        </a:xfrm>
+      </p:grpSpPr>
+      <p:sp>
+        <p:nvSpPr>
+          <p:cNvPr id="2" name="Slide Image Placeholder 1"/>
+          <p:cNvSpPr>
+            <a:spLocks noGrp="1" noRot="1" noChangeAspect="1"/>
+          </p:cNvSpPr>
+          <p:nvPr>
+            <p:ph type="sldImg"/>
+          </p:nvPr>
+        </p:nvSpPr>
+        <p:spPr/>
+      </p:sp>
+      <p:sp>
+        <p:nvSpPr>
+          <p:cNvPr id="3" name="Notes Placeholder 2"/>
+          <p:cNvSpPr>
+            <a:spLocks noGrp="1"/>
+          </p:cNvSpPr>
+          <p:nvPr>
+            <p:ph type="body" idx="1"/>
+          </p:nvPr>
+        </p:nvSpPr>
+        <p:spPr/>
+        <p:txBody>
+          <a:bodyPr/>
+          <a:lstStyle/>
+          <a:p>
+            <a:r>
+              <a:rPr lang="en-US" dirty="0"/>
+              <a:t>Mobile app may allow custom designs </a:t>
+            </a:r>
+            <a:r>
+              <a:rPr lang="en-US"/>
+              <a:t>of shoes and </a:t>
+            </a:r>
+            <a:r>
+              <a:rPr lang="en-US" dirty="0"/>
+              <a:t>have </a:t>
+            </a:r>
+            <a:r>
+              <a:rPr lang="en-US"/>
+              <a:t>extra features. </a:t>
+            </a:r>
+            <a:endParaRPr lang="en-US" dirty="0"/>
+          </a:p>
+        </p:txBody>
+      </p:sp>
+      <p:sp>
+        <p:nvSpPr>
+          <p:cNvPr id="4" name="Slide Number Placeholder 3"/>
+          <p:cNvSpPr>
+            <a:spLocks noGrp="1"/>
+          </p:cNvSpPr>
+          <p:nvPr>
+            <p:ph type="sldNum" sz="quarter" idx="5"/>
+          </p:nvPr>
+        </p:nvSpPr>
+        <p:spPr/>
+        <p:txBody>
+          <a:bodyPr/>
+          <a:lstStyle/>
+          <a:p>
+            <a:fld id="{A4734E7D-97B8-4B73-AB0E-D947BF4B77F8}" type="slidenum">
+              <a:rPr lang="en-US" smtClean="0"/>
+              <a:t>7</a:t>
+            </a:fld>
+            <a:endParaRPr lang="en-US"/>
+          </a:p>
+        </p:txBody>
+      </p:sp>
+    </p:spTree>
+    <p:extLst>
+      <p:ext uri="{BB962C8B-B14F-4D97-AF65-F5344CB8AC3E}">
+        <p14:creationId xmlns:p14="http://schemas.microsoft.com/office/powerpoint/2010/main" val="3976478512"/>
       </p:ext>
     </p:extLst>
   </p:cSld>
@@ -20667,7 +20811,7 @@
           <a:p>
             <a:fld id="{5E7AA473-D82F-4EFF-9DF7-AE6D83C51288}" type="datetime1">
               <a:rPr lang="en-US" smtClean="0"/>
-              <a:t>3/1/2022</a:t>
+              <a:t>3/2/2022</a:t>
             </a:fld>
             <a:endParaRPr lang="en-US"/>
           </a:p>
@@ -20921,7 +21065,7 @@
           <a:p>
             <a:fld id="{1E12F1F0-FE2D-4C1C-B320-8CB9BE735F0F}" type="datetime1">
               <a:rPr lang="en-US" smtClean="0"/>
-              <a:t>3/1/2022</a:t>
+              <a:t>3/2/2022</a:t>
             </a:fld>
             <a:endParaRPr lang="en-US"/>
           </a:p>
@@ -21189,7 +21333,7 @@
           <a:p>
             <a:fld id="{2CF1B96C-10FD-4EBC-9029-9652B7535D02}" type="datetime1">
               <a:rPr lang="en-US" smtClean="0"/>
-              <a:t>3/1/2022</a:t>
+              <a:t>3/2/2022</a:t>
             </a:fld>
             <a:endParaRPr lang="en-US"/>
           </a:p>
@@ -21443,7 +21587,7 @@
           <a:p>
             <a:fld id="{14878474-CC00-4A95-9D50-A41C12D1EEC4}" type="datetime1">
               <a:rPr lang="en-US" smtClean="0"/>
-              <a:t>3/1/2022</a:t>
+              <a:t>3/2/2022</a:t>
             </a:fld>
             <a:endParaRPr lang="en-US"/>
           </a:p>
@@ -21721,7 +21865,7 @@
           <a:p>
             <a:fld id="{7F38C8B4-7FBB-408F-BDB9-F0496874AFB2}" type="datetime1">
               <a:rPr lang="en-US" smtClean="0"/>
-              <a:t>3/1/2022</a:t>
+              <a:t>3/2/2022</a:t>
             </a:fld>
             <a:endParaRPr lang="en-US"/>
           </a:p>
@@ -21993,7 +22137,7 @@
           <a:p>
             <a:fld id="{2BB8EE20-A5E2-47D3-8F6D-A2BA7AB2E093}" type="datetime1">
               <a:rPr lang="en-US" smtClean="0"/>
-              <a:t>3/1/2022</a:t>
+              <a:t>3/2/2022</a:t>
             </a:fld>
             <a:endParaRPr lang="en-US"/>
           </a:p>
@@ -22551,7 +22695,7 @@
           <a:p>
             <a:fld id="{3382CF99-132F-413F-B7EF-71A5C33F2ED6}" type="datetime1">
               <a:rPr lang="en-US" smtClean="0"/>
-              <a:t>3/1/2022</a:t>
+              <a:t>3/2/2022</a:t>
             </a:fld>
             <a:endParaRPr lang="en-US"/>
           </a:p>
@@ -22693,7 +22837,7 @@
           <a:p>
             <a:fld id="{1F17AE06-98E0-4D9F-A059-92C3548821BB}" type="datetime1">
               <a:rPr lang="en-US" smtClean="0"/>
-              <a:t>3/1/2022</a:t>
+              <a:t>3/2/2022</a:t>
             </a:fld>
             <a:endParaRPr lang="en-US"/>
           </a:p>
@@ -22806,7 +22950,7 @@
           <a:p>
             <a:fld id="{FFBA00CA-3DDC-4705-B840-978EF5EA0707}" type="datetime1">
               <a:rPr lang="en-US" smtClean="0"/>
-              <a:t>3/1/2022</a:t>
+              <a:t>3/2/2022</a:t>
             </a:fld>
             <a:endParaRPr lang="en-US"/>
           </a:p>
@@ -23125,7 +23269,7 @@
           <a:p>
             <a:fld id="{FC366D49-0BBA-4C5A-AD96-6448CA63451A}" type="datetime1">
               <a:rPr lang="en-US" smtClean="0"/>
-              <a:t>3/1/2022</a:t>
+              <a:t>3/2/2022</a:t>
             </a:fld>
             <a:endParaRPr lang="en-US"/>
           </a:p>
@@ -23422,7 +23566,7 @@
           <a:p>
             <a:fld id="{4F4EB293-A316-472D-A8B4-6947CF1A12B7}" type="datetime1">
               <a:rPr lang="en-US" smtClean="0"/>
-              <a:t>3/1/2022</a:t>
+              <a:t>3/2/2022</a:t>
             </a:fld>
             <a:endParaRPr lang="en-US"/>
           </a:p>
@@ -23701,7 +23845,7 @@
           <a:p>
             <a:fld id="{734BCCD4-CEB1-405B-A443-DD9CBCBEA552}" type="datetime1">
               <a:rPr lang="en-US" smtClean="0"/>
-              <a:t>3/1/2022</a:t>
+              <a:t>3/2/2022</a:t>
             </a:fld>
             <a:endParaRPr lang="en-US"/>
           </a:p>
@@ -24779,7 +24923,7 @@
             <p:ph idx="1"/>
             <p:extLst>
               <p:ext uri="{D42A27DB-BD31-4B8C-83A1-F6EECF244321}">
-                <p14:modId xmlns:p14="http://schemas.microsoft.com/office/powerpoint/2010/main" val="880825011"/>
+                <p14:modId xmlns:p14="http://schemas.microsoft.com/office/powerpoint/2010/main" val="360105358"/>
               </p:ext>
             </p:extLst>
           </p:nvPr>
@@ -24804,13 +24948,13 @@
   <p:clrMapOvr>
     <a:masterClrMapping/>
   </p:clrMapOvr>
-  <mc:AlternateContent xmlns:mc="http://schemas.openxmlformats.org/markup-compatibility/2006">
-    <mc:Choice xmlns:p14="http://schemas.microsoft.com/office/powerpoint/2010/main" Requires="p14">
+  <mc:AlternateContent xmlns:mc="http://schemas.openxmlformats.org/markup-compatibility/2006" xmlns:p14="http://schemas.microsoft.com/office/powerpoint/2010/main">
+    <mc:Choice Requires="p14">
       <p:transition spd="med" p14:dur="700">
         <p:fade/>
       </p:transition>
     </mc:Choice>
-    <mc:Fallback>
+    <mc:Fallback xmlns="">
       <p:transition spd="med">
         <p:fade/>
       </p:transition>
@@ -25052,13 +25196,13 @@
   <p:clrMapOvr>
     <a:masterClrMapping/>
   </p:clrMapOvr>
-  <mc:AlternateContent xmlns:mc="http://schemas.openxmlformats.org/markup-compatibility/2006">
-    <mc:Choice xmlns:p159="http://schemas.microsoft.com/office/powerpoint/2015/09/main" Requires="p159">
+  <mc:AlternateContent xmlns:mc="http://schemas.openxmlformats.org/markup-compatibility/2006" xmlns:p159="http://schemas.microsoft.com/office/powerpoint/2015/09/main">
+    <mc:Choice Requires="p159">
       <p:transition xmlns:p14="http://schemas.microsoft.com/office/powerpoint/2010/main" spd="slow" p14:dur="2000">
         <p159:morph option="byObject"/>
       </p:transition>
     </mc:Choice>
-    <mc:Fallback>
+    <mc:Fallback xmlns="">
       <p:transition spd="slow">
         <p:fade/>
       </p:transition>
@@ -25363,13 +25507,13 @@
   <p:clrMapOvr>
     <a:masterClrMapping/>
   </p:clrMapOvr>
-  <mc:AlternateContent xmlns:mc="http://schemas.openxmlformats.org/markup-compatibility/2006">
-    <mc:Choice xmlns:p159="http://schemas.microsoft.com/office/powerpoint/2015/09/main" Requires="p159">
+  <mc:AlternateContent xmlns:mc="http://schemas.openxmlformats.org/markup-compatibility/2006" xmlns:p159="http://schemas.microsoft.com/office/powerpoint/2015/09/main">
+    <mc:Choice Requires="p159">
       <p:transition xmlns:p14="http://schemas.microsoft.com/office/powerpoint/2010/main" spd="slow" p14:dur="2000">
         <p159:morph option="byObject"/>
       </p:transition>
     </mc:Choice>
-    <mc:Fallback>
+    <mc:Fallback xmlns="">
       <p:transition spd="slow">
         <p:fade/>
       </p:transition>
@@ -25606,13 +25750,13 @@
   <p:clrMapOvr>
     <a:masterClrMapping/>
   </p:clrMapOvr>
-  <mc:AlternateContent xmlns:mc="http://schemas.openxmlformats.org/markup-compatibility/2006">
-    <mc:Choice xmlns:p159="http://schemas.microsoft.com/office/powerpoint/2015/09/main" Requires="p159">
+  <mc:AlternateContent xmlns:mc="http://schemas.openxmlformats.org/markup-compatibility/2006" xmlns:p159="http://schemas.microsoft.com/office/powerpoint/2015/09/main">
+    <mc:Choice Requires="p159">
       <p:transition xmlns:p14="http://schemas.microsoft.com/office/powerpoint/2010/main" spd="slow" p14:dur="2000">
         <p159:morph option="byObject"/>
       </p:transition>
     </mc:Choice>
-    <mc:Fallback>
+    <mc:Fallback xmlns="">
       <p:transition spd="slow">
         <p:fade/>
       </p:transition>
@@ -25922,7 +26066,7 @@
             <p:ph idx="1"/>
             <p:extLst>
               <p:ext uri="{D42A27DB-BD31-4B8C-83A1-F6EECF244321}">
-                <p14:modId xmlns:p14="http://schemas.microsoft.com/office/powerpoint/2010/main" val="2651869040"/>
+                <p14:modId xmlns:p14="http://schemas.microsoft.com/office/powerpoint/2010/main" val="1476000308"/>
               </p:ext>
             </p:extLst>
           </p:nvPr>
@@ -25947,13 +26091,13 @@
   <p:clrMapOvr>
     <a:masterClrMapping/>
   </p:clrMapOvr>
-  <mc:AlternateContent xmlns:mc="http://schemas.openxmlformats.org/markup-compatibility/2006">
-    <mc:Choice xmlns:p159="http://schemas.microsoft.com/office/powerpoint/2015/09/main" Requires="p159">
+  <mc:AlternateContent xmlns:mc="http://schemas.openxmlformats.org/markup-compatibility/2006" xmlns:p159="http://schemas.microsoft.com/office/powerpoint/2015/09/main">
+    <mc:Choice Requires="p159">
       <p:transition xmlns:p14="http://schemas.microsoft.com/office/powerpoint/2010/main" spd="slow" p14:dur="2000">
         <p159:morph option="byObject"/>
       </p:transition>
     </mc:Choice>
-    <mc:Fallback>
+    <mc:Fallback xmlns="">
       <p:transition spd="slow">
         <p:fade/>
       </p:transition>
@@ -26188,7 +26332,7 @@
         </p:xfrm>
         <a:graphic>
           <a:graphicData uri="http://schemas.openxmlformats.org/drawingml/2006/diagram">
-            <dgm:relIds xmlns:dgm="http://schemas.openxmlformats.org/drawingml/2006/diagram" xmlns:r="http://schemas.openxmlformats.org/officeDocument/2006/relationships" r:dm="rId2" r:lo="rId3" r:qs="rId4" r:cs="rId5"/>
+            <dgm:relIds xmlns:dgm="http://schemas.openxmlformats.org/drawingml/2006/diagram" xmlns:r="http://schemas.openxmlformats.org/officeDocument/2006/relationships" r:dm="rId3" r:lo="rId4" r:qs="rId5" r:cs="rId6"/>
           </a:graphicData>
         </a:graphic>
       </p:graphicFrame>
@@ -26202,6 +26346,18 @@
   <p:clrMapOvr>
     <a:masterClrMapping/>
   </p:clrMapOvr>
+  <mc:AlternateContent xmlns:mc="http://schemas.openxmlformats.org/markup-compatibility/2006" xmlns:p159="http://schemas.microsoft.com/office/powerpoint/2015/09/main">
+    <mc:Choice Requires="p159">
+      <p:transition xmlns:p14="http://schemas.microsoft.com/office/powerpoint/2010/main" spd="slow" p14:dur="2000">
+        <p159:morph option="byObject"/>
+      </p:transition>
+    </mc:Choice>
+    <mc:Fallback xmlns="">
+      <p:transition spd="slow">
+        <p:fade/>
+      </p:transition>
+    </mc:Fallback>
+  </mc:AlternateContent>
 </p:sld>
 </file>
 

</xml_diff>